<commit_message>
Working on final project - analysis of simulation data and continuing to organize repository
</commit_message>
<xml_diff>
--- a/docs/Stone_presentation_12-8-19.pptx
+++ b/docs/Stone_presentation_12-8-19.pptx
@@ -8,12 +8,17 @@
     <p:sldId id="256" r:id="rId2"/>
     <p:sldId id="262" r:id="rId3"/>
     <p:sldId id="257" r:id="rId4"/>
-    <p:sldId id="258" r:id="rId5"/>
-    <p:sldId id="259" r:id="rId6"/>
-    <p:sldId id="260" r:id="rId7"/>
-    <p:sldId id="264" r:id="rId8"/>
-    <p:sldId id="263" r:id="rId9"/>
-    <p:sldId id="261" r:id="rId10"/>
+    <p:sldId id="267" r:id="rId5"/>
+    <p:sldId id="258" r:id="rId6"/>
+    <p:sldId id="266" r:id="rId7"/>
+    <p:sldId id="265" r:id="rId8"/>
+    <p:sldId id="268" r:id="rId9"/>
+    <p:sldId id="259" r:id="rId10"/>
+    <p:sldId id="260" r:id="rId11"/>
+    <p:sldId id="264" r:id="rId12"/>
+    <p:sldId id="263" r:id="rId13"/>
+    <p:sldId id="261" r:id="rId14"/>
+    <p:sldId id="269" r:id="rId15"/>
   </p:sldIdLst>
   <p:sldSz cx="12192000" cy="6858000"/>
   <p:notesSz cx="6858000" cy="9144000"/>
@@ -249,7 +254,7 @@
           <a:p>
             <a:fld id="{53DC798D-381E-ED4A-8F36-6CFFBD026857}" type="datetimeFigureOut">
               <a:rPr lang="en-US" smtClean="0"/>
-              <a:t>12/5/2019</a:t>
+              <a:t>12/9/2019</a:t>
             </a:fld>
             <a:endParaRPr lang="en-US"/>
           </a:p>
@@ -417,7 +422,7 @@
           <a:p>
             <a:fld id="{53DC798D-381E-ED4A-8F36-6CFFBD026857}" type="datetimeFigureOut">
               <a:rPr lang="en-US" smtClean="0"/>
-              <a:t>12/5/2019</a:t>
+              <a:t>12/9/2019</a:t>
             </a:fld>
             <a:endParaRPr lang="en-US"/>
           </a:p>
@@ -595,7 +600,7 @@
           <a:p>
             <a:fld id="{53DC798D-381E-ED4A-8F36-6CFFBD026857}" type="datetimeFigureOut">
               <a:rPr lang="en-US" smtClean="0"/>
-              <a:t>12/5/2019</a:t>
+              <a:t>12/9/2019</a:t>
             </a:fld>
             <a:endParaRPr lang="en-US"/>
           </a:p>
@@ -763,7 +768,7 @@
           <a:p>
             <a:fld id="{53DC798D-381E-ED4A-8F36-6CFFBD026857}" type="datetimeFigureOut">
               <a:rPr lang="en-US" smtClean="0"/>
-              <a:t>12/5/2019</a:t>
+              <a:t>12/9/2019</a:t>
             </a:fld>
             <a:endParaRPr lang="en-US"/>
           </a:p>
@@ -1008,7 +1013,7 @@
           <a:p>
             <a:fld id="{53DC798D-381E-ED4A-8F36-6CFFBD026857}" type="datetimeFigureOut">
               <a:rPr lang="en-US" smtClean="0"/>
-              <a:t>12/5/2019</a:t>
+              <a:t>12/9/2019</a:t>
             </a:fld>
             <a:endParaRPr lang="en-US"/>
           </a:p>
@@ -1237,7 +1242,7 @@
           <a:p>
             <a:fld id="{53DC798D-381E-ED4A-8F36-6CFFBD026857}" type="datetimeFigureOut">
               <a:rPr lang="en-US" smtClean="0"/>
-              <a:t>12/5/2019</a:t>
+              <a:t>12/9/2019</a:t>
             </a:fld>
             <a:endParaRPr lang="en-US"/>
           </a:p>
@@ -1601,7 +1606,7 @@
           <a:p>
             <a:fld id="{53DC798D-381E-ED4A-8F36-6CFFBD026857}" type="datetimeFigureOut">
               <a:rPr lang="en-US" smtClean="0"/>
-              <a:t>12/5/2019</a:t>
+              <a:t>12/9/2019</a:t>
             </a:fld>
             <a:endParaRPr lang="en-US"/>
           </a:p>
@@ -1718,7 +1723,7 @@
           <a:p>
             <a:fld id="{53DC798D-381E-ED4A-8F36-6CFFBD026857}" type="datetimeFigureOut">
               <a:rPr lang="en-US" smtClean="0"/>
-              <a:t>12/5/2019</a:t>
+              <a:t>12/9/2019</a:t>
             </a:fld>
             <a:endParaRPr lang="en-US"/>
           </a:p>
@@ -1813,7 +1818,7 @@
           <a:p>
             <a:fld id="{53DC798D-381E-ED4A-8F36-6CFFBD026857}" type="datetimeFigureOut">
               <a:rPr lang="en-US" smtClean="0"/>
-              <a:t>12/5/2019</a:t>
+              <a:t>12/9/2019</a:t>
             </a:fld>
             <a:endParaRPr lang="en-US"/>
           </a:p>
@@ -2088,7 +2093,7 @@
           <a:p>
             <a:fld id="{53DC798D-381E-ED4A-8F36-6CFFBD026857}" type="datetimeFigureOut">
               <a:rPr lang="en-US" smtClean="0"/>
-              <a:t>12/5/2019</a:t>
+              <a:t>12/9/2019</a:t>
             </a:fld>
             <a:endParaRPr lang="en-US"/>
           </a:p>
@@ -2340,7 +2345,7 @@
           <a:p>
             <a:fld id="{53DC798D-381E-ED4A-8F36-6CFFBD026857}" type="datetimeFigureOut">
               <a:rPr lang="en-US" smtClean="0"/>
-              <a:t>12/5/2019</a:t>
+              <a:t>12/9/2019</a:t>
             </a:fld>
             <a:endParaRPr lang="en-US"/>
           </a:p>
@@ -2551,7 +2556,7 @@
           <a:p>
             <a:fld id="{53DC798D-381E-ED4A-8F36-6CFFBD026857}" type="datetimeFigureOut">
               <a:rPr lang="en-US" smtClean="0"/>
-              <a:t>12/5/2019</a:t>
+              <a:t>12/9/2019</a:t>
             </a:fld>
             <a:endParaRPr lang="en-US"/>
           </a:p>
@@ -3038,6 +3043,687 @@
 </p:sld>
 </file>
 
+<file path=ppt/slides/slide10.xml><?xml version="1.0" encoding="utf-8"?>
+<p:sld xmlns:a="http://schemas.openxmlformats.org/drawingml/2006/main" xmlns:r="http://schemas.openxmlformats.org/officeDocument/2006/relationships" xmlns:p="http://schemas.openxmlformats.org/presentationml/2006/main">
+  <p:cSld>
+    <p:spTree>
+      <p:nvGrpSpPr>
+        <p:cNvPr id="1" name=""/>
+        <p:cNvGrpSpPr/>
+        <p:nvPr/>
+      </p:nvGrpSpPr>
+      <p:grpSpPr>
+        <a:xfrm>
+          <a:off x="0" y="0"/>
+          <a:ext cx="0" cy="0"/>
+          <a:chOff x="0" y="0"/>
+          <a:chExt cx="0" cy="0"/>
+        </a:xfrm>
+      </p:grpSpPr>
+      <p:sp>
+        <p:nvSpPr>
+          <p:cNvPr id="2" name="Title 1"/>
+          <p:cNvSpPr>
+            <a:spLocks noGrp="1"/>
+          </p:cNvSpPr>
+          <p:nvPr>
+            <p:ph type="title"/>
+          </p:nvPr>
+        </p:nvSpPr>
+        <p:spPr/>
+        <p:txBody>
+          <a:bodyPr/>
+          <a:lstStyle/>
+          <a:p>
+            <a:r>
+              <a:rPr lang="en-US" dirty="0"/>
+              <a:t>Results (1-2 slides)</a:t>
+            </a:r>
+          </a:p>
+        </p:txBody>
+      </p:sp>
+      <p:sp>
+        <p:nvSpPr>
+          <p:cNvPr id="3" name="Content Placeholder 2"/>
+          <p:cNvSpPr>
+            <a:spLocks noGrp="1"/>
+          </p:cNvSpPr>
+          <p:nvPr>
+            <p:ph idx="1"/>
+          </p:nvPr>
+        </p:nvSpPr>
+        <p:spPr/>
+        <p:txBody>
+          <a:bodyPr/>
+          <a:lstStyle/>
+          <a:p>
+            <a:r>
+              <a:rPr lang="en-US" dirty="0"/>
+              <a:t>What did you find? Show us the graph that best displays your results. </a:t>
+            </a:r>
+          </a:p>
+        </p:txBody>
+      </p:sp>
+    </p:spTree>
+    <p:extLst>
+      <p:ext uri="{BB962C8B-B14F-4D97-AF65-F5344CB8AC3E}">
+        <p14:creationId xmlns:p14="http://schemas.microsoft.com/office/powerpoint/2010/main" val="760348242"/>
+      </p:ext>
+    </p:extLst>
+  </p:cSld>
+  <p:clrMapOvr>
+    <a:masterClrMapping/>
+  </p:clrMapOvr>
+</p:sld>
+</file>
+
+<file path=ppt/slides/slide11.xml><?xml version="1.0" encoding="utf-8"?>
+<p:sld xmlns:a="http://schemas.openxmlformats.org/drawingml/2006/main" xmlns:r="http://schemas.openxmlformats.org/officeDocument/2006/relationships" xmlns:p="http://schemas.openxmlformats.org/presentationml/2006/main">
+  <p:cSld>
+    <p:spTree>
+      <p:nvGrpSpPr>
+        <p:cNvPr id="1" name=""/>
+        <p:cNvGrpSpPr/>
+        <p:nvPr/>
+      </p:nvGrpSpPr>
+      <p:grpSpPr>
+        <a:xfrm>
+          <a:off x="0" y="0"/>
+          <a:ext cx="0" cy="0"/>
+          <a:chOff x="0" y="0"/>
+          <a:chExt cx="0" cy="0"/>
+        </a:xfrm>
+      </p:grpSpPr>
+      <p:sp>
+        <p:nvSpPr>
+          <p:cNvPr id="2" name="Title 1">
+            <a:extLst>
+              <a:ext uri="{FF2B5EF4-FFF2-40B4-BE49-F238E27FC236}">
+                <a16:creationId xmlns:a16="http://schemas.microsoft.com/office/drawing/2014/main" id="{296079BA-5B6B-4C82-BE64-F411D2FF6498}"/>
+              </a:ext>
+            </a:extLst>
+          </p:cNvPr>
+          <p:cNvSpPr>
+            <a:spLocks noGrp="1"/>
+          </p:cNvSpPr>
+          <p:nvPr>
+            <p:ph type="title"/>
+          </p:nvPr>
+        </p:nvSpPr>
+        <p:spPr/>
+        <p:txBody>
+          <a:bodyPr/>
+          <a:lstStyle/>
+          <a:p>
+            <a:endParaRPr lang="en-US" dirty="0"/>
+          </a:p>
+        </p:txBody>
+      </p:sp>
+      <p:sp>
+        <p:nvSpPr>
+          <p:cNvPr id="3" name="Content Placeholder 2">
+            <a:extLst>
+              <a:ext uri="{FF2B5EF4-FFF2-40B4-BE49-F238E27FC236}">
+                <a16:creationId xmlns:a16="http://schemas.microsoft.com/office/drawing/2014/main" id="{4F05E96C-22FC-4615-9849-F6B29883A301}"/>
+              </a:ext>
+            </a:extLst>
+          </p:cNvPr>
+          <p:cNvSpPr>
+            <a:spLocks noGrp="1"/>
+          </p:cNvSpPr>
+          <p:nvPr>
+            <p:ph idx="1"/>
+          </p:nvPr>
+        </p:nvSpPr>
+        <p:spPr/>
+        <p:txBody>
+          <a:bodyPr/>
+          <a:lstStyle/>
+          <a:p>
+            <a:endParaRPr lang="en-US"/>
+          </a:p>
+        </p:txBody>
+      </p:sp>
+    </p:spTree>
+    <p:extLst>
+      <p:ext uri="{BB962C8B-B14F-4D97-AF65-F5344CB8AC3E}">
+        <p14:creationId xmlns:p14="http://schemas.microsoft.com/office/powerpoint/2010/main" val="4083783458"/>
+      </p:ext>
+    </p:extLst>
+  </p:cSld>
+  <p:clrMapOvr>
+    <a:masterClrMapping/>
+  </p:clrMapOvr>
+</p:sld>
+</file>
+
+<file path=ppt/slides/slide12.xml><?xml version="1.0" encoding="utf-8"?>
+<p:sld xmlns:a="http://schemas.openxmlformats.org/drawingml/2006/main" xmlns:r="http://schemas.openxmlformats.org/officeDocument/2006/relationships" xmlns:p="http://schemas.openxmlformats.org/presentationml/2006/main">
+  <p:cSld>
+    <p:spTree>
+      <p:nvGrpSpPr>
+        <p:cNvPr id="1" name=""/>
+        <p:cNvGrpSpPr/>
+        <p:nvPr/>
+      </p:nvGrpSpPr>
+      <p:grpSpPr>
+        <a:xfrm>
+          <a:off x="0" y="0"/>
+          <a:ext cx="0" cy="0"/>
+          <a:chOff x="0" y="0"/>
+          <a:chExt cx="0" cy="0"/>
+        </a:xfrm>
+      </p:grpSpPr>
+      <p:sp>
+        <p:nvSpPr>
+          <p:cNvPr id="2" name="Title 1">
+            <a:extLst>
+              <a:ext uri="{FF2B5EF4-FFF2-40B4-BE49-F238E27FC236}">
+                <a16:creationId xmlns:a16="http://schemas.microsoft.com/office/drawing/2014/main" id="{F39AA3A6-495F-4E33-962F-C614E5087E20}"/>
+              </a:ext>
+            </a:extLst>
+          </p:cNvPr>
+          <p:cNvSpPr>
+            <a:spLocks noGrp="1"/>
+          </p:cNvSpPr>
+          <p:nvPr>
+            <p:ph type="title"/>
+          </p:nvPr>
+        </p:nvSpPr>
+        <p:spPr/>
+        <p:txBody>
+          <a:bodyPr/>
+          <a:lstStyle/>
+          <a:p>
+            <a:r>
+              <a:rPr lang="en-US" dirty="0"/>
+              <a:t>Simulated Vegetable Data </a:t>
+            </a:r>
+          </a:p>
+        </p:txBody>
+      </p:sp>
+      <p:pic>
+        <p:nvPicPr>
+          <p:cNvPr id="4" name="Content Placeholder 3">
+            <a:extLst>
+              <a:ext uri="{FF2B5EF4-FFF2-40B4-BE49-F238E27FC236}">
+                <a16:creationId xmlns:a16="http://schemas.microsoft.com/office/drawing/2014/main" id="{C9EE3CD4-007D-4C73-8CCB-7EA625A19BDD}"/>
+              </a:ext>
+            </a:extLst>
+          </p:cNvPr>
+          <p:cNvPicPr>
+            <a:picLocks noGrp="1" noChangeAspect="1"/>
+          </p:cNvPicPr>
+          <p:nvPr>
+            <p:ph idx="1"/>
+          </p:nvPr>
+        </p:nvPicPr>
+        <p:blipFill>
+          <a:blip r:embed="rId2"/>
+          <a:stretch>
+            <a:fillRect/>
+          </a:stretch>
+        </p:blipFill>
+        <p:spPr>
+          <a:xfrm>
+            <a:off x="2573918" y="1825625"/>
+            <a:ext cx="7044163" cy="4351338"/>
+          </a:xfrm>
+          <a:prstGeom prst="rect">
+            <a:avLst/>
+          </a:prstGeom>
+        </p:spPr>
+      </p:pic>
+    </p:spTree>
+    <p:extLst>
+      <p:ext uri="{BB962C8B-B14F-4D97-AF65-F5344CB8AC3E}">
+        <p14:creationId xmlns:p14="http://schemas.microsoft.com/office/powerpoint/2010/main" val="3499134431"/>
+      </p:ext>
+    </p:extLst>
+  </p:cSld>
+  <p:clrMapOvr>
+    <a:masterClrMapping/>
+  </p:clrMapOvr>
+</p:sld>
+</file>
+
+<file path=ppt/slides/slide13.xml><?xml version="1.0" encoding="utf-8"?>
+<p:sld xmlns:a="http://schemas.openxmlformats.org/drawingml/2006/main" xmlns:r="http://schemas.openxmlformats.org/officeDocument/2006/relationships" xmlns:p="http://schemas.openxmlformats.org/presentationml/2006/main">
+  <p:cSld>
+    <p:spTree>
+      <p:nvGrpSpPr>
+        <p:cNvPr id="1" name=""/>
+        <p:cNvGrpSpPr/>
+        <p:nvPr/>
+      </p:nvGrpSpPr>
+      <p:grpSpPr>
+        <a:xfrm>
+          <a:off x="0" y="0"/>
+          <a:ext cx="0" cy="0"/>
+          <a:chOff x="0" y="0"/>
+          <a:chExt cx="0" cy="0"/>
+        </a:xfrm>
+      </p:grpSpPr>
+      <p:sp>
+        <p:nvSpPr>
+          <p:cNvPr id="2" name="Title 1"/>
+          <p:cNvSpPr>
+            <a:spLocks noGrp="1"/>
+          </p:cNvSpPr>
+          <p:nvPr>
+            <p:ph type="title"/>
+          </p:nvPr>
+        </p:nvSpPr>
+        <p:spPr/>
+        <p:txBody>
+          <a:bodyPr/>
+          <a:lstStyle/>
+          <a:p>
+            <a:r>
+              <a:rPr lang="en-US" dirty="0"/>
+              <a:t>Discussion (1 slide)</a:t>
+            </a:r>
+          </a:p>
+        </p:txBody>
+      </p:sp>
+      <p:sp>
+        <p:nvSpPr>
+          <p:cNvPr id="3" name="Content Placeholder 2"/>
+          <p:cNvSpPr>
+            <a:spLocks noGrp="1"/>
+          </p:cNvSpPr>
+          <p:nvPr>
+            <p:ph idx="1"/>
+          </p:nvPr>
+        </p:nvSpPr>
+        <p:spPr/>
+        <p:txBody>
+          <a:bodyPr/>
+          <a:lstStyle/>
+          <a:p>
+            <a:r>
+              <a:rPr lang="en-US" dirty="0"/>
+              <a:t>What does this mean? Interpret your results in light of your original question/hypothesis</a:t>
+            </a:r>
+          </a:p>
+        </p:txBody>
+      </p:sp>
+    </p:spTree>
+    <p:extLst>
+      <p:ext uri="{BB962C8B-B14F-4D97-AF65-F5344CB8AC3E}">
+        <p14:creationId xmlns:p14="http://schemas.microsoft.com/office/powerpoint/2010/main" val="1437867342"/>
+      </p:ext>
+    </p:extLst>
+  </p:cSld>
+  <p:clrMapOvr>
+    <a:masterClrMapping/>
+  </p:clrMapOvr>
+</p:sld>
+</file>
+
+<file path=ppt/slides/slide14.xml><?xml version="1.0" encoding="utf-8"?>
+<p:sld xmlns:a="http://schemas.openxmlformats.org/drawingml/2006/main" xmlns:r="http://schemas.openxmlformats.org/officeDocument/2006/relationships" xmlns:p="http://schemas.openxmlformats.org/presentationml/2006/main">
+  <p:cSld>
+    <p:spTree>
+      <p:nvGrpSpPr>
+        <p:cNvPr id="1" name=""/>
+        <p:cNvGrpSpPr/>
+        <p:nvPr/>
+      </p:nvGrpSpPr>
+      <p:grpSpPr>
+        <a:xfrm>
+          <a:off x="0" y="0"/>
+          <a:ext cx="0" cy="0"/>
+          <a:chOff x="0" y="0"/>
+          <a:chExt cx="0" cy="0"/>
+        </a:xfrm>
+      </p:grpSpPr>
+      <p:sp>
+        <p:nvSpPr>
+          <p:cNvPr id="2" name="Title 1">
+            <a:extLst>
+              <a:ext uri="{FF2B5EF4-FFF2-40B4-BE49-F238E27FC236}">
+                <a16:creationId xmlns:a16="http://schemas.microsoft.com/office/drawing/2014/main" id="{5703D081-9EB2-4BD4-8BEC-7A47A44DA681}"/>
+              </a:ext>
+            </a:extLst>
+          </p:cNvPr>
+          <p:cNvSpPr>
+            <a:spLocks noGrp="1"/>
+          </p:cNvSpPr>
+          <p:nvPr>
+            <p:ph type="title"/>
+          </p:nvPr>
+        </p:nvSpPr>
+        <p:spPr/>
+        <p:txBody>
+          <a:bodyPr/>
+          <a:lstStyle/>
+          <a:p>
+            <a:r>
+              <a:rPr lang="en-US" altLang="en-US" dirty="0">
+                <a:latin typeface="Calibri" panose="020F0502020204030204" pitchFamily="34" charset="0"/>
+                <a:ea typeface="Calibri" panose="020F0502020204030204" pitchFamily="34" charset="0"/>
+                <a:cs typeface="Times New Roman" panose="02020603050405020304" pitchFamily="18" charset="0"/>
+              </a:rPr>
+              <a:t>Sources</a:t>
+            </a:r>
+            <a:endParaRPr lang="en-US" dirty="0"/>
+          </a:p>
+        </p:txBody>
+      </p:sp>
+      <p:sp>
+        <p:nvSpPr>
+          <p:cNvPr id="4" name="Rectangle 1">
+            <a:extLst>
+              <a:ext uri="{FF2B5EF4-FFF2-40B4-BE49-F238E27FC236}">
+                <a16:creationId xmlns:a16="http://schemas.microsoft.com/office/drawing/2014/main" id="{88A7D3A7-B6A7-452B-BE08-881A12395DA5}"/>
+              </a:ext>
+            </a:extLst>
+          </p:cNvPr>
+          <p:cNvSpPr>
+            <a:spLocks noGrp="1" noChangeArrowheads="1"/>
+          </p:cNvSpPr>
+          <p:nvPr>
+            <p:ph idx="1"/>
+          </p:nvPr>
+        </p:nvSpPr>
+        <p:spPr bwMode="auto">
+          <a:xfrm>
+            <a:off x="838200" y="1892674"/>
+            <a:ext cx="10515600" cy="3323987"/>
+          </a:xfrm>
+          <a:prstGeom prst="rect">
+            <a:avLst/>
+          </a:prstGeom>
+          <a:solidFill>
+            <a:srgbClr val="FFFFFF"/>
+          </a:solidFill>
+          <a:ln>
+            <a:noFill/>
+          </a:ln>
+          <a:effectLst/>
+          <a:extLst>
+            <a:ext uri="{91240B29-F687-4F45-9708-019B960494DF}">
+              <a14:hiddenLine xmlns:a14="http://schemas.microsoft.com/office/drawing/2010/main" w="9525">
+                <a:solidFill>
+                  <a:schemeClr val="tx1"/>
+                </a:solidFill>
+                <a:miter lim="800000"/>
+                <a:headEnd/>
+                <a:tailEnd/>
+              </a14:hiddenLine>
+            </a:ext>
+            <a:ext uri="{AF507438-7753-43E0-B8FC-AC1667EBCBE1}">
+              <a14:hiddenEffects xmlns:a14="http://schemas.microsoft.com/office/drawing/2010/main">
+                <a:effectLst>
+                  <a:outerShdw dist="35921" dir="2700000" algn="ctr" rotWithShape="0">
+                    <a:schemeClr val="bg2"/>
+                  </a:outerShdw>
+                </a:effectLst>
+              </a14:hiddenEffects>
+            </a:ext>
+          </a:extLst>
+        </p:spPr>
+        <p:txBody>
+          <a:bodyPr vert="horz" wrap="square" lIns="0" tIns="0" rIns="0" bIns="0" numCol="1" anchor="ctr" anchorCtr="0" compatLnSpc="1">
+            <a:prstTxWarp prst="textNoShape">
+              <a:avLst/>
+            </a:prstTxWarp>
+            <a:spAutoFit/>
+          </a:bodyPr>
+          <a:lstStyle/>
+          <a:p>
+            <a:pPr marL="0" marR="0" lvl="0" indent="0" algn="l" defTabSz="914400" rtl="0" eaLnBrk="0" fontAlgn="base" latinLnBrk="0" hangingPunct="0">
+              <a:lnSpc>
+                <a:spcPct val="100000"/>
+              </a:lnSpc>
+              <a:spcBef>
+                <a:spcPct val="0"/>
+              </a:spcBef>
+              <a:spcAft>
+                <a:spcPct val="0"/>
+              </a:spcAft>
+              <a:buClrTx/>
+              <a:buSzTx/>
+              <a:buFontTx/>
+              <a:buNone/>
+              <a:tabLst/>
+            </a:pPr>
+            <a:r>
+              <a:rPr kumimoji="0" lang="en-US" altLang="en-US" sz="2400" b="0" i="0" u="none" strike="noStrike" cap="none" normalizeH="0" baseline="0" dirty="0">
+                <a:ln>
+                  <a:noFill/>
+                </a:ln>
+                <a:solidFill>
+                  <a:schemeClr val="tx1"/>
+                </a:solidFill>
+                <a:effectLst/>
+                <a:latin typeface="Calibri" panose="020F0502020204030204" pitchFamily="34" charset="0"/>
+                <a:ea typeface="Calibri" panose="020F0502020204030204" pitchFamily="34" charset="0"/>
+                <a:cs typeface="Calibri" panose="020F0502020204030204" pitchFamily="34" charset="0"/>
+              </a:rPr>
+              <a:t>R Core Team (2013). R: A language and environment for statistical computing. R Foundation for Statistical Computing, Vienna, Austria. URL http://www.R-project.org/. </a:t>
+            </a:r>
+          </a:p>
+          <a:p>
+            <a:pPr marL="0" marR="0" lvl="0" indent="0" algn="l" defTabSz="914400" rtl="0" eaLnBrk="0" fontAlgn="base" latinLnBrk="0" hangingPunct="0">
+              <a:lnSpc>
+                <a:spcPct val="100000"/>
+              </a:lnSpc>
+              <a:spcBef>
+                <a:spcPct val="0"/>
+              </a:spcBef>
+              <a:spcAft>
+                <a:spcPct val="0"/>
+              </a:spcAft>
+              <a:buClrTx/>
+              <a:buSzTx/>
+              <a:buFontTx/>
+              <a:buNone/>
+              <a:tabLst/>
+            </a:pPr>
+            <a:endParaRPr kumimoji="0" lang="en-US" altLang="en-US" sz="2400" b="0" i="0" u="none" strike="noStrike" cap="none" normalizeH="0" baseline="0" dirty="0">
+              <a:ln>
+                <a:noFill/>
+              </a:ln>
+              <a:solidFill>
+                <a:srgbClr val="000000"/>
+              </a:solidFill>
+              <a:effectLst/>
+              <a:latin typeface="Calibri" panose="020F0502020204030204" pitchFamily="34" charset="0"/>
+              <a:ea typeface="Times New Roman" panose="02020603050405020304" pitchFamily="18" charset="0"/>
+              <a:cs typeface="Calibri" panose="020F0502020204030204" pitchFamily="34" charset="0"/>
+            </a:endParaRPr>
+          </a:p>
+          <a:p>
+            <a:pPr marL="0" marR="0" lvl="0" indent="0" algn="l" defTabSz="914400" rtl="0" eaLnBrk="0" fontAlgn="base" latinLnBrk="0" hangingPunct="0">
+              <a:lnSpc>
+                <a:spcPct val="100000"/>
+              </a:lnSpc>
+              <a:spcBef>
+                <a:spcPct val="0"/>
+              </a:spcBef>
+              <a:spcAft>
+                <a:spcPct val="0"/>
+              </a:spcAft>
+              <a:buClrTx/>
+              <a:buSzTx/>
+              <a:buFontTx/>
+              <a:buNone/>
+              <a:tabLst/>
+            </a:pPr>
+            <a:r>
+              <a:rPr kumimoji="0" lang="en-US" altLang="en-US" sz="2400" b="0" i="0" u="none" strike="noStrike" cap="none" normalizeH="0" baseline="0" dirty="0">
+                <a:ln>
+                  <a:noFill/>
+                </a:ln>
+                <a:solidFill>
+                  <a:srgbClr val="000000"/>
+                </a:solidFill>
+                <a:effectLst/>
+                <a:latin typeface="Calibri" panose="020F0502020204030204" pitchFamily="34" charset="0"/>
+                <a:ea typeface="Times New Roman" panose="02020603050405020304" pitchFamily="18" charset="0"/>
+                <a:cs typeface="Calibri" panose="020F0502020204030204" pitchFamily="34" charset="0"/>
+              </a:rPr>
+              <a:t>Wickham, Hadley. (2016) ggplot2: Elegant Graphics for Data Analysis. Springer-Verlag New York.</a:t>
+            </a:r>
+          </a:p>
+          <a:p>
+            <a:pPr marL="0" marR="0" lvl="0" indent="0" algn="l" defTabSz="914400" rtl="0" eaLnBrk="0" fontAlgn="base" latinLnBrk="0" hangingPunct="0">
+              <a:lnSpc>
+                <a:spcPct val="100000"/>
+              </a:lnSpc>
+              <a:spcBef>
+                <a:spcPct val="0"/>
+              </a:spcBef>
+              <a:spcAft>
+                <a:spcPct val="0"/>
+              </a:spcAft>
+              <a:buClrTx/>
+              <a:buSzTx/>
+              <a:buFontTx/>
+              <a:buNone/>
+              <a:tabLst/>
+            </a:pPr>
+            <a:endParaRPr lang="en-US" altLang="en-US" sz="2400" dirty="0">
+              <a:solidFill>
+                <a:srgbClr val="000000"/>
+              </a:solidFill>
+              <a:latin typeface="Calibri" panose="020F0502020204030204" pitchFamily="34" charset="0"/>
+              <a:ea typeface="Times New Roman" panose="02020603050405020304" pitchFamily="18" charset="0"/>
+              <a:cs typeface="Calibri" panose="020F0502020204030204" pitchFamily="34" charset="0"/>
+            </a:endParaRPr>
+          </a:p>
+          <a:p>
+            <a:pPr marL="0" marR="0" lvl="0" indent="0" algn="l" defTabSz="914400" rtl="0" eaLnBrk="0" fontAlgn="base" latinLnBrk="0" hangingPunct="0">
+              <a:lnSpc>
+                <a:spcPct val="100000"/>
+              </a:lnSpc>
+              <a:spcBef>
+                <a:spcPct val="0"/>
+              </a:spcBef>
+              <a:spcAft>
+                <a:spcPct val="0"/>
+              </a:spcAft>
+              <a:buClrTx/>
+              <a:buSzTx/>
+              <a:buFontTx/>
+              <a:buNone/>
+              <a:tabLst/>
+            </a:pPr>
+            <a:r>
+              <a:rPr kumimoji="0" lang="en-US" altLang="en-US" sz="2400" b="0" i="0" u="none" strike="noStrike" cap="none" normalizeH="0" baseline="0" dirty="0">
+                <a:ln>
+                  <a:noFill/>
+                </a:ln>
+                <a:solidFill>
+                  <a:srgbClr val="000000"/>
+                </a:solidFill>
+                <a:effectLst/>
+                <a:latin typeface="Calibri" panose="020F0502020204030204" pitchFamily="34" charset="0"/>
+                <a:ea typeface="Times New Roman" panose="02020603050405020304" pitchFamily="18" charset="0"/>
+                <a:cs typeface="Calibri" panose="020F0502020204030204" pitchFamily="34" charset="0"/>
+              </a:rPr>
+              <a:t>Wickham, Hadley (2017). </a:t>
+            </a:r>
+            <a:r>
+              <a:rPr kumimoji="0" lang="en-US" altLang="en-US" sz="2400" b="0" i="0" u="none" strike="noStrike" cap="none" normalizeH="0" baseline="0" dirty="0" err="1">
+                <a:ln>
+                  <a:noFill/>
+                </a:ln>
+                <a:solidFill>
+                  <a:srgbClr val="000000"/>
+                </a:solidFill>
+                <a:effectLst/>
+                <a:latin typeface="Calibri" panose="020F0502020204030204" pitchFamily="34" charset="0"/>
+                <a:ea typeface="Times New Roman" panose="02020603050405020304" pitchFamily="18" charset="0"/>
+                <a:cs typeface="Calibri" panose="020F0502020204030204" pitchFamily="34" charset="0"/>
+              </a:rPr>
+              <a:t>tidyverse</a:t>
+            </a:r>
+            <a:r>
+              <a:rPr kumimoji="0" lang="en-US" altLang="en-US" sz="2400" b="0" i="0" u="none" strike="noStrike" cap="none" normalizeH="0" baseline="0" dirty="0">
+                <a:ln>
+                  <a:noFill/>
+                </a:ln>
+                <a:solidFill>
+                  <a:srgbClr val="000000"/>
+                </a:solidFill>
+                <a:effectLst/>
+                <a:latin typeface="Calibri" panose="020F0502020204030204" pitchFamily="34" charset="0"/>
+                <a:ea typeface="Times New Roman" panose="02020603050405020304" pitchFamily="18" charset="0"/>
+                <a:cs typeface="Calibri" panose="020F0502020204030204" pitchFamily="34" charset="0"/>
+              </a:rPr>
+              <a:t>: Easily Install and Load the '</a:t>
+            </a:r>
+            <a:r>
+              <a:rPr kumimoji="0" lang="en-US" altLang="en-US" sz="2400" b="0" i="0" u="none" strike="noStrike" cap="none" normalizeH="0" baseline="0" dirty="0" err="1">
+                <a:ln>
+                  <a:noFill/>
+                </a:ln>
+                <a:solidFill>
+                  <a:srgbClr val="000000"/>
+                </a:solidFill>
+                <a:effectLst/>
+                <a:latin typeface="Calibri" panose="020F0502020204030204" pitchFamily="34" charset="0"/>
+                <a:ea typeface="Times New Roman" panose="02020603050405020304" pitchFamily="18" charset="0"/>
+                <a:cs typeface="Calibri" panose="020F0502020204030204" pitchFamily="34" charset="0"/>
+              </a:rPr>
+              <a:t>Tidyverse</a:t>
+            </a:r>
+            <a:r>
+              <a:rPr kumimoji="0" lang="en-US" altLang="en-US" sz="2400" b="0" i="0" u="none" strike="noStrike" cap="none" normalizeH="0" baseline="0" dirty="0">
+                <a:ln>
+                  <a:noFill/>
+                </a:ln>
+                <a:solidFill>
+                  <a:srgbClr val="000000"/>
+                </a:solidFill>
+                <a:effectLst/>
+                <a:latin typeface="Calibri" panose="020F0502020204030204" pitchFamily="34" charset="0"/>
+                <a:ea typeface="Times New Roman" panose="02020603050405020304" pitchFamily="18" charset="0"/>
+                <a:cs typeface="Calibri" panose="020F0502020204030204" pitchFamily="34" charset="0"/>
+              </a:rPr>
+              <a:t>'. R package version 1.2.1. https://CRAN.R-project.org/package=tidyverse</a:t>
+            </a:r>
+            <a:r>
+              <a:rPr kumimoji="0" lang="en-US" altLang="en-US" sz="2400" b="0" i="0" u="none" strike="noStrike" cap="none" normalizeH="0" baseline="0" dirty="0">
+                <a:ln>
+                  <a:noFill/>
+                </a:ln>
+                <a:solidFill>
+                  <a:schemeClr val="tx1"/>
+                </a:solidFill>
+                <a:effectLst/>
+              </a:rPr>
+              <a:t> </a:t>
+            </a:r>
+            <a:endParaRPr kumimoji="0" lang="en-US" altLang="en-US" sz="2400" b="0" i="0" u="none" strike="noStrike" cap="none" normalizeH="0" baseline="0" dirty="0">
+              <a:ln>
+                <a:noFill/>
+              </a:ln>
+              <a:solidFill>
+                <a:schemeClr val="tx1"/>
+              </a:solidFill>
+              <a:effectLst/>
+              <a:latin typeface="Arial" panose="020B0604020202020204" pitchFamily="34" charset="0"/>
+            </a:endParaRPr>
+          </a:p>
+        </p:txBody>
+      </p:sp>
+    </p:spTree>
+    <p:extLst>
+      <p:ext uri="{BB962C8B-B14F-4D97-AF65-F5344CB8AC3E}">
+        <p14:creationId xmlns:p14="http://schemas.microsoft.com/office/powerpoint/2010/main" val="2112887923"/>
+      </p:ext>
+    </p:extLst>
+  </p:cSld>
+  <p:clrMapOvr>
+    <a:masterClrMapping/>
+  </p:clrMapOvr>
+</p:sld>
+</file>
+
 <file path=ppt/slides/slide2.xml><?xml version="1.0" encoding="utf-8"?>
 <p:sld xmlns:a="http://schemas.openxmlformats.org/drawingml/2006/main" xmlns:r="http://schemas.openxmlformats.org/officeDocument/2006/relationships" xmlns:p="http://schemas.openxmlformats.org/presentationml/2006/main">
   <p:cSld>
@@ -3501,7 +4187,13 @@
       </p:grpSpPr>
       <p:sp>
         <p:nvSpPr>
-          <p:cNvPr id="2" name="Title 1"/>
+          <p:cNvPr id="2" name="Title 1">
+            <a:extLst>
+              <a:ext uri="{FF2B5EF4-FFF2-40B4-BE49-F238E27FC236}">
+                <a16:creationId xmlns:a16="http://schemas.microsoft.com/office/drawing/2014/main" id="{1B9B17B8-A1E2-4C9B-9ECD-3709EEB70F19}"/>
+              </a:ext>
+            </a:extLst>
+          </p:cNvPr>
           <p:cNvSpPr>
             <a:spLocks noGrp="1"/>
           </p:cNvSpPr>
@@ -3516,14 +4208,20 @@
           <a:p>
             <a:r>
               <a:rPr lang="en-US" dirty="0"/>
-              <a:t>Methods</a:t>
-            </a:r>
-          </a:p>
-        </p:txBody>
-      </p:sp>
-      <p:sp>
-        <p:nvSpPr>
-          <p:cNvPr id="3" name="Content Placeholder 2"/>
+              <a:t>Methods: Part 1</a:t>
+            </a:r>
+          </a:p>
+        </p:txBody>
+      </p:sp>
+      <p:sp>
+        <p:nvSpPr>
+          <p:cNvPr id="3" name="Content Placeholder 2">
+            <a:extLst>
+              <a:ext uri="{FF2B5EF4-FFF2-40B4-BE49-F238E27FC236}">
+                <a16:creationId xmlns:a16="http://schemas.microsoft.com/office/drawing/2014/main" id="{A2B83ED2-DBF6-402F-A11B-DA121E9E510B}"/>
+              </a:ext>
+            </a:extLst>
+          </p:cNvPr>
           <p:cNvSpPr>
             <a:spLocks noGrp="1"/>
           </p:cNvSpPr>
@@ -3531,37 +4229,130 @@
             <p:ph idx="1"/>
           </p:nvPr>
         </p:nvSpPr>
-        <p:spPr/>
-        <p:txBody>
-          <a:bodyPr/>
-          <a:lstStyle/>
-          <a:p>
+        <p:spPr>
+          <a:xfrm>
+            <a:off x="838200" y="1825625"/>
+            <a:ext cx="10515600" cy="4667250"/>
+          </a:xfrm>
+        </p:spPr>
+        <p:txBody>
+          <a:bodyPr>
+            <a:normAutofit fontScale="92500" lnSpcReduction="10000"/>
+          </a:bodyPr>
+          <a:lstStyle/>
+          <a:p>
+            <a:pPr>
+              <a:spcAft>
+                <a:spcPts val="1200"/>
+              </a:spcAft>
+            </a:pPr>
+            <a:endParaRPr lang="en-US" dirty="0"/>
+          </a:p>
+          <a:p>
+            <a:pPr>
+              <a:spcAft>
+                <a:spcPts val="1200"/>
+              </a:spcAft>
+            </a:pPr>
             <a:r>
               <a:rPr lang="en-US" dirty="0"/>
-              <a:t>To run a Simulated vegetable consumption data using mean and 95% confidence intervals which were converted to standard deviations</a:t>
+              <a:t>Response: food category consumed (</a:t>
+            </a:r>
+            <a:r>
+              <a:rPr lang="en-US" dirty="0" err="1"/>
+              <a:t>lbs</a:t>
+            </a:r>
+            <a:r>
+              <a:rPr lang="en-US" dirty="0"/>
+              <a:t>) / year</a:t>
+            </a:r>
+          </a:p>
+          <a:p>
+            <a:pPr lvl="1">
+              <a:spcAft>
+                <a:spcPts val="1200"/>
+              </a:spcAft>
+            </a:pPr>
+            <a:r>
+              <a:rPr lang="en-US" dirty="0"/>
+              <a:t>Fruits</a:t>
+            </a:r>
+          </a:p>
+          <a:p>
+            <a:pPr lvl="1">
+              <a:spcAft>
+                <a:spcPts val="1200"/>
+              </a:spcAft>
+            </a:pPr>
+            <a:r>
+              <a:rPr lang="en-US" dirty="0"/>
+              <a:t>Vegetables</a:t>
+            </a:r>
+          </a:p>
+          <a:p>
+            <a:pPr lvl="1">
+              <a:spcAft>
+                <a:spcPts val="1200"/>
+              </a:spcAft>
+            </a:pPr>
+            <a:r>
+              <a:rPr lang="en-US" dirty="0"/>
+              <a:t>Meat</a:t>
+            </a:r>
+          </a:p>
+          <a:p>
+            <a:pPr lvl="1">
+              <a:spcAft>
+                <a:spcPts val="1200"/>
+              </a:spcAft>
+            </a:pPr>
+            <a:r>
+              <a:rPr lang="en-US" dirty="0"/>
+              <a:t>Dairy</a:t>
+            </a:r>
+          </a:p>
+          <a:p>
+            <a:pPr lvl="1">
+              <a:spcAft>
+                <a:spcPts val="1200"/>
+              </a:spcAft>
+            </a:pPr>
+            <a:r>
+              <a:rPr lang="en-US" dirty="0"/>
+              <a:t>Grain</a:t>
+            </a:r>
+          </a:p>
+          <a:p>
+            <a:pPr lvl="1">
+              <a:spcAft>
+                <a:spcPts val="1200"/>
+              </a:spcAft>
+            </a:pPr>
+            <a:r>
+              <a:rPr lang="en-US" dirty="0"/>
+              <a:t>Oil</a:t>
+            </a:r>
+          </a:p>
+          <a:p>
+            <a:pPr>
+              <a:spcAft>
+                <a:spcPts val="1200"/>
+              </a:spcAft>
+            </a:pPr>
+            <a:r>
+              <a:rPr lang="en-US" dirty="0"/>
+              <a:t>Predictors: income level, year</a:t>
             </a:r>
           </a:p>
           <a:p>
             <a:endParaRPr lang="en-US" dirty="0"/>
-          </a:p>
-          <a:p>
-            <a:r>
-              <a:rPr lang="en-US" dirty="0"/>
-              <a:t>How did you test your question?  (focus just on the part you are analyzing for this class)</a:t>
-            </a:r>
-          </a:p>
-          <a:p>
-            <a:r>
-              <a:rPr lang="en-US" dirty="0"/>
-              <a:t>Be sure to clearly convey how you measured your response (what did you count/measure/observe?) and your predictors and covariates</a:t>
-            </a:r>
           </a:p>
         </p:txBody>
       </p:sp>
     </p:spTree>
     <p:extLst>
       <p:ext uri="{BB962C8B-B14F-4D97-AF65-F5344CB8AC3E}">
-        <p14:creationId xmlns:p14="http://schemas.microsoft.com/office/powerpoint/2010/main" val="100775222"/>
+        <p14:creationId xmlns:p14="http://schemas.microsoft.com/office/powerpoint/2010/main" val="3546057565"/>
       </p:ext>
     </p:extLst>
   </p:cSld>
@@ -3605,7 +4396,7 @@
           <a:p>
             <a:r>
               <a:rPr lang="en-US" dirty="0"/>
-              <a:t>Analysis (~3 slides)</a:t>
+              <a:t>Methods: Part 2</a:t>
             </a:r>
           </a:p>
         </p:txBody>
@@ -3620,26 +4411,97 @@
             <p:ph idx="1"/>
           </p:nvPr>
         </p:nvSpPr>
-        <p:spPr/>
-        <p:txBody>
-          <a:bodyPr/>
-          <a:lstStyle/>
-          <a:p>
+        <p:spPr>
+          <a:xfrm>
+            <a:off x="838200" y="1558925"/>
+            <a:ext cx="10515600" cy="4813300"/>
+          </a:xfrm>
+        </p:spPr>
+        <p:txBody>
+          <a:bodyPr>
+            <a:normAutofit/>
+          </a:bodyPr>
+          <a:lstStyle/>
+          <a:p>
+            <a:pPr>
+              <a:spcAft>
+                <a:spcPts val="1200"/>
+              </a:spcAft>
+            </a:pPr>
             <a:r>
               <a:rPr lang="en-US" dirty="0"/>
-              <a:t>What was your approach? What type of model did you fit? </a:t>
-            </a:r>
-          </a:p>
-          <a:p>
+              <a:t>Simulated vegetable consumption data using mean and 95% confidence intervals which were converted to standard deviations</a:t>
+            </a:r>
+          </a:p>
+          <a:p>
+            <a:pPr>
+              <a:spcAft>
+                <a:spcPts val="1200"/>
+              </a:spcAft>
+            </a:pPr>
             <a:r>
               <a:rPr lang="en-US" dirty="0"/>
-              <a:t>Present the formula for your linear model (if relevant)</a:t>
-            </a:r>
-          </a:p>
-          <a:p>
+              <a:t>6000 total data points – similar to 5000 participants in the survey for vegetable consumption (</a:t>
+            </a:r>
+            <a:r>
+              <a:rPr lang="en-US" dirty="0" err="1"/>
+              <a:t>lbs</a:t>
+            </a:r>
             <a:r>
               <a:rPr lang="en-US" dirty="0"/>
-              <a:t>How did you assess significance/importance of predictors? </a:t>
+              <a:t>/year)</a:t>
+            </a:r>
+          </a:p>
+          <a:p>
+            <a:pPr lvl="1">
+              <a:spcAft>
+                <a:spcPts val="1200"/>
+              </a:spcAft>
+            </a:pPr>
+            <a:r>
+              <a:rPr lang="en-US" dirty="0"/>
+              <a:t>2000 per income level (low, average, high)</a:t>
+            </a:r>
+          </a:p>
+          <a:p>
+            <a:pPr lvl="1">
+              <a:spcAft>
+                <a:spcPts val="1200"/>
+              </a:spcAft>
+            </a:pPr>
+            <a:r>
+              <a:rPr lang="en-US" dirty="0"/>
+              <a:t>1500 per year (1994 – 1998, 2003 – 2004, 2005 – 2006, 2007 – 2008)</a:t>
+            </a:r>
+          </a:p>
+          <a:p>
+            <a:pPr>
+              <a:spcAft>
+                <a:spcPts val="1200"/>
+              </a:spcAft>
+            </a:pPr>
+            <a:r>
+              <a:rPr lang="en-US" dirty="0"/>
+              <a:t>Response: vegetables consumed (</a:t>
+            </a:r>
+            <a:r>
+              <a:rPr lang="en-US" dirty="0" err="1"/>
+              <a:t>lbs</a:t>
+            </a:r>
+            <a:r>
+              <a:rPr lang="en-US" dirty="0"/>
+              <a:t>) / year</a:t>
+            </a:r>
+          </a:p>
+          <a:p>
+            <a:pPr>
+              <a:spcAft>
+                <a:spcPts val="1200"/>
+              </a:spcAft>
+            </a:pPr>
+            <a:r>
+              <a:rPr lang="en-US" dirty="0"/>
+              <a:t>Predictors: income level, year</a:t>
             </a:r>
           </a:p>
         </p:txBody>
@@ -3647,7 +4509,7 @@
     </p:spTree>
     <p:extLst>
       <p:ext uri="{BB962C8B-B14F-4D97-AF65-F5344CB8AC3E}">
-        <p14:creationId xmlns:p14="http://schemas.microsoft.com/office/powerpoint/2010/main" val="589861561"/>
+        <p14:creationId xmlns:p14="http://schemas.microsoft.com/office/powerpoint/2010/main" val="100775222"/>
       </p:ext>
     </p:extLst>
   </p:cSld>
@@ -3676,7 +4538,13 @@
       </p:grpSpPr>
       <p:sp>
         <p:nvSpPr>
-          <p:cNvPr id="2" name="Title 1"/>
+          <p:cNvPr id="2" name="Title 1">
+            <a:extLst>
+              <a:ext uri="{FF2B5EF4-FFF2-40B4-BE49-F238E27FC236}">
+                <a16:creationId xmlns:a16="http://schemas.microsoft.com/office/drawing/2014/main" id="{1BE7B98D-F6B9-4F16-86CA-CE1F27F999CC}"/>
+              </a:ext>
+            </a:extLst>
+          </p:cNvPr>
           <p:cNvSpPr>
             <a:spLocks noGrp="1"/>
           </p:cNvSpPr>
@@ -3691,14 +4559,20 @@
           <a:p>
             <a:r>
               <a:rPr lang="en-US" dirty="0"/>
-              <a:t>Results (1-2 slides)</a:t>
-            </a:r>
-          </a:p>
-        </p:txBody>
-      </p:sp>
-      <p:sp>
-        <p:nvSpPr>
-          <p:cNvPr id="3" name="Content Placeholder 2"/>
+              <a:t>Simulated Vegetable Data Exploration</a:t>
+            </a:r>
+          </a:p>
+        </p:txBody>
+      </p:sp>
+      <p:sp>
+        <p:nvSpPr>
+          <p:cNvPr id="3" name="Content Placeholder 2">
+            <a:extLst>
+              <a:ext uri="{FF2B5EF4-FFF2-40B4-BE49-F238E27FC236}">
+                <a16:creationId xmlns:a16="http://schemas.microsoft.com/office/drawing/2014/main" id="{66268904-33DE-43C3-9408-2720E9C3FBE7}"/>
+              </a:ext>
+            </a:extLst>
+          </p:cNvPr>
           <p:cNvSpPr>
             <a:spLocks noGrp="1"/>
           </p:cNvSpPr>
@@ -3706,14 +4580,79 @@
             <p:ph idx="1"/>
           </p:nvPr>
         </p:nvSpPr>
-        <p:spPr/>
+        <p:spPr>
+          <a:xfrm>
+            <a:off x="838200" y="1825625"/>
+            <a:ext cx="10515600" cy="4351338"/>
+          </a:xfrm>
+        </p:spPr>
         <p:txBody>
           <a:bodyPr/>
           <a:lstStyle/>
           <a:p>
             <a:r>
               <a:rPr lang="en-US" dirty="0"/>
-              <a:t>What did you find? Show us the graph that best displays your results. </a:t>
+              <a:t>Compared three modeling approaches in data exploration:</a:t>
+            </a:r>
+          </a:p>
+          <a:p>
+            <a:pPr lvl="1">
+              <a:lnSpc>
+                <a:spcPct val="100000"/>
+              </a:lnSpc>
+              <a:spcBef>
+                <a:spcPts val="1200"/>
+              </a:spcBef>
+            </a:pPr>
+            <a:r>
+              <a:rPr lang="en-US" dirty="0"/>
+              <a:t>Experimental Approach – removing non-significant interactions until remaining variables are significant</a:t>
+            </a:r>
+          </a:p>
+          <a:p>
+            <a:pPr lvl="1">
+              <a:lnSpc>
+                <a:spcPct val="100000"/>
+              </a:lnSpc>
+              <a:spcBef>
+                <a:spcPts val="1200"/>
+              </a:spcBef>
+            </a:pPr>
+            <a:r>
+              <a:rPr lang="en-US" b="1" dirty="0"/>
+              <a:t>Fit-Full Model – no model selection – remove non-significant interactions</a:t>
+            </a:r>
+          </a:p>
+          <a:p>
+            <a:pPr lvl="1">
+              <a:lnSpc>
+                <a:spcPct val="100000"/>
+              </a:lnSpc>
+              <a:spcBef>
+                <a:spcPts val="1200"/>
+              </a:spcBef>
+            </a:pPr>
+            <a:r>
+              <a:rPr lang="en-US" dirty="0"/>
+              <a:t>AIC/BIC – theoretical approach without p-values </a:t>
+            </a:r>
+          </a:p>
+          <a:p>
+            <a:pPr marL="457200" lvl="1" indent="0">
+              <a:lnSpc>
+                <a:spcPct val="100000"/>
+              </a:lnSpc>
+              <a:spcBef>
+                <a:spcPts val="1200"/>
+              </a:spcBef>
+              <a:buNone/>
+            </a:pPr>
+            <a:endParaRPr lang="en-US" dirty="0"/>
+          </a:p>
+          <a:p>
+            <a:r>
+              <a:rPr lang="en-US" dirty="0"/>
+              <a:t>Interactions between income level and year were not significant and were thus excluded from the final model selected</a:t>
             </a:r>
           </a:p>
         </p:txBody>
@@ -3721,7 +4660,7 @@
     </p:spTree>
     <p:extLst>
       <p:ext uri="{BB962C8B-B14F-4D97-AF65-F5344CB8AC3E}">
-        <p14:creationId xmlns:p14="http://schemas.microsoft.com/office/powerpoint/2010/main" val="760348242"/>
+        <p14:creationId xmlns:p14="http://schemas.microsoft.com/office/powerpoint/2010/main" val="588324118"/>
       </p:ext>
     </p:extLst>
   </p:cSld>
@@ -3753,7 +4692,7 @@
           <p:cNvPr id="2" name="Title 1">
             <a:extLst>
               <a:ext uri="{FF2B5EF4-FFF2-40B4-BE49-F238E27FC236}">
-                <a16:creationId xmlns:a16="http://schemas.microsoft.com/office/drawing/2014/main" id="{296079BA-5B6B-4C82-BE64-F411D2FF6498}"/>
+                <a16:creationId xmlns:a16="http://schemas.microsoft.com/office/drawing/2014/main" id="{6CEB9065-6845-44B8-AFC5-C26271C4A6A0}"/>
               </a:ext>
             </a:extLst>
           </p:cNvPr>
@@ -3764,12 +4703,20 @@
             <p:ph type="title"/>
           </p:nvPr>
         </p:nvSpPr>
-        <p:spPr/>
-        <p:txBody>
-          <a:bodyPr/>
-          <a:lstStyle/>
-          <a:p>
-            <a:endParaRPr lang="en-US" dirty="0"/>
+        <p:spPr>
+          <a:xfrm>
+            <a:off x="495300" y="0"/>
+            <a:ext cx="10515600" cy="1325563"/>
+          </a:xfrm>
+        </p:spPr>
+        <p:txBody>
+          <a:bodyPr/>
+          <a:lstStyle/>
+          <a:p>
+            <a:r>
+              <a:rPr lang="en-US" dirty="0"/>
+              <a:t>Simulated Vegetable Data Statistical Analysis</a:t>
+            </a:r>
           </a:p>
         </p:txBody>
       </p:sp>
@@ -3778,7 +4725,7 @@
           <p:cNvPr id="3" name="Content Placeholder 2">
             <a:extLst>
               <a:ext uri="{FF2B5EF4-FFF2-40B4-BE49-F238E27FC236}">
-                <a16:creationId xmlns:a16="http://schemas.microsoft.com/office/drawing/2014/main" id="{4F05E96C-22FC-4615-9849-F6B29883A301}"/>
+                <a16:creationId xmlns:a16="http://schemas.microsoft.com/office/drawing/2014/main" id="{8582AD71-43BE-44D6-A77C-DA5B7D2B175A}"/>
               </a:ext>
             </a:extLst>
           </p:cNvPr>
@@ -3789,19 +4736,114 @@
             <p:ph idx="1"/>
           </p:nvPr>
         </p:nvSpPr>
-        <p:spPr/>
-        <p:txBody>
-          <a:bodyPr/>
-          <a:lstStyle/>
-          <a:p>
-            <a:endParaRPr lang="en-US"/>
-          </a:p>
-        </p:txBody>
-      </p:sp>
+        <p:spPr>
+          <a:xfrm>
+            <a:off x="638175" y="1253331"/>
+            <a:ext cx="10515600" cy="4351338"/>
+          </a:xfrm>
+        </p:spPr>
+        <p:txBody>
+          <a:bodyPr>
+            <a:normAutofit/>
+          </a:bodyPr>
+          <a:lstStyle/>
+          <a:p>
+            <a:r>
+              <a:rPr lang="en-US" dirty="0"/>
+              <a:t>Assessed significance using p-values </a:t>
+            </a:r>
+          </a:p>
+          <a:p>
+            <a:r>
+              <a:rPr lang="en-US" dirty="0"/>
+              <a:t>Used </a:t>
+            </a:r>
+            <a:r>
+              <a:rPr lang="en-US" dirty="0" err="1"/>
+              <a:t>lm</a:t>
+            </a:r>
+            <a:r>
+              <a:rPr lang="en-US" dirty="0"/>
+              <a:t> (linear model) – response was normally distributed based on results from the </a:t>
+            </a:r>
+            <a:r>
+              <a:rPr lang="en-US" dirty="0" err="1"/>
+              <a:t>resid_panel</a:t>
+            </a:r>
+            <a:r>
+              <a:rPr lang="en-US" dirty="0"/>
+              <a:t> </a:t>
+            </a:r>
+          </a:p>
+          <a:p>
+            <a:endParaRPr lang="en-US" dirty="0"/>
+          </a:p>
+        </p:txBody>
+      </p:sp>
+      <p:pic>
+        <p:nvPicPr>
+          <p:cNvPr id="5" name="Picture 4">
+            <a:extLst>
+              <a:ext uri="{FF2B5EF4-FFF2-40B4-BE49-F238E27FC236}">
+                <a16:creationId xmlns:a16="http://schemas.microsoft.com/office/drawing/2014/main" id="{87191F5C-9D42-4491-B2A8-457F2EE18B00}"/>
+              </a:ext>
+            </a:extLst>
+          </p:cNvPr>
+          <p:cNvPicPr>
+            <a:picLocks noChangeAspect="1"/>
+          </p:cNvPicPr>
+          <p:nvPr/>
+        </p:nvPicPr>
+        <p:blipFill>
+          <a:blip r:embed="rId2"/>
+          <a:stretch>
+            <a:fillRect/>
+          </a:stretch>
+        </p:blipFill>
+        <p:spPr>
+          <a:xfrm>
+            <a:off x="257175" y="3309285"/>
+            <a:ext cx="4625213" cy="2928938"/>
+          </a:xfrm>
+          <a:prstGeom prst="rect">
+            <a:avLst/>
+          </a:prstGeom>
+        </p:spPr>
+      </p:pic>
+      <p:pic>
+        <p:nvPicPr>
+          <p:cNvPr id="6" name="Picture 5">
+            <a:extLst>
+              <a:ext uri="{FF2B5EF4-FFF2-40B4-BE49-F238E27FC236}">
+                <a16:creationId xmlns:a16="http://schemas.microsoft.com/office/drawing/2014/main" id="{290CCE5B-3774-4622-9D5E-D41CA9E78BDD}"/>
+              </a:ext>
+            </a:extLst>
+          </p:cNvPr>
+          <p:cNvPicPr>
+            <a:picLocks noChangeAspect="1"/>
+          </p:cNvPicPr>
+          <p:nvPr/>
+        </p:nvPicPr>
+        <p:blipFill>
+          <a:blip r:embed="rId3"/>
+          <a:stretch>
+            <a:fillRect/>
+          </a:stretch>
+        </p:blipFill>
+        <p:spPr>
+          <a:xfrm>
+            <a:off x="5587789" y="2959894"/>
+            <a:ext cx="5861262" cy="3613107"/>
+          </a:xfrm>
+          <a:prstGeom prst="rect">
+            <a:avLst/>
+          </a:prstGeom>
+        </p:spPr>
+      </p:pic>
     </p:spTree>
     <p:extLst>
       <p:ext uri="{BB962C8B-B14F-4D97-AF65-F5344CB8AC3E}">
-        <p14:creationId xmlns:p14="http://schemas.microsoft.com/office/powerpoint/2010/main" val="4083783458"/>
+        <p14:creationId xmlns:p14="http://schemas.microsoft.com/office/powerpoint/2010/main" val="758602096"/>
       </p:ext>
     </p:extLst>
   </p:cSld>
@@ -3833,7 +4875,7 @@
           <p:cNvPr id="2" name="Title 1">
             <a:extLst>
               <a:ext uri="{FF2B5EF4-FFF2-40B4-BE49-F238E27FC236}">
-                <a16:creationId xmlns:a16="http://schemas.microsoft.com/office/drawing/2014/main" id="{F39AA3A6-495F-4E33-962F-C614E5087E20}"/>
+                <a16:creationId xmlns:a16="http://schemas.microsoft.com/office/drawing/2014/main" id="{8D29779D-B0C2-4FBC-8781-82AACE4BCADE}"/>
               </a:ext>
             </a:extLst>
           </p:cNvPr>
@@ -3851,26 +4893,87 @@
           <a:p>
             <a:r>
               <a:rPr lang="en-US" dirty="0"/>
-              <a:t>Simulated Vegetable Data </a:t>
-            </a:r>
+              <a:t>Simulated Vegetable Data Statistical Analysis</a:t>
+            </a:r>
+          </a:p>
+        </p:txBody>
+      </p:sp>
+      <p:sp>
+        <p:nvSpPr>
+          <p:cNvPr id="3" name="Content Placeholder 2">
+            <a:extLst>
+              <a:ext uri="{FF2B5EF4-FFF2-40B4-BE49-F238E27FC236}">
+                <a16:creationId xmlns:a16="http://schemas.microsoft.com/office/drawing/2014/main" id="{0FB6F5C3-ACB7-4932-92DD-736674C911B7}"/>
+              </a:ext>
+            </a:extLst>
+          </p:cNvPr>
+          <p:cNvSpPr>
+            <a:spLocks noGrp="1"/>
+          </p:cNvSpPr>
+          <p:nvPr>
+            <p:ph idx="1"/>
+          </p:nvPr>
+        </p:nvSpPr>
+        <p:spPr/>
+        <p:txBody>
+          <a:bodyPr/>
+          <a:lstStyle/>
+          <a:p>
+            <a:r>
+              <a:rPr lang="en-US" dirty="0"/>
+              <a:t>vegsimmod2a &lt;- </a:t>
+            </a:r>
+            <a:r>
+              <a:rPr lang="en-US" dirty="0" err="1"/>
+              <a:t>lm</a:t>
+            </a:r>
+            <a:r>
+              <a:rPr lang="en-US" dirty="0"/>
+              <a:t>(</a:t>
+            </a:r>
+            <a:r>
+              <a:rPr lang="en-US" dirty="0" err="1"/>
+              <a:t>simveg</a:t>
+            </a:r>
+            <a:r>
+              <a:rPr lang="en-US" dirty="0"/>
+              <a:t> ~ </a:t>
+            </a:r>
+            <a:r>
+              <a:rPr lang="en-US" dirty="0" err="1"/>
+              <a:t>incomelevel+year</a:t>
+            </a:r>
+            <a:r>
+              <a:rPr lang="en-US" dirty="0"/>
+              <a:t>, data=</a:t>
+            </a:r>
+            <a:r>
+              <a:rPr lang="en-US" dirty="0" err="1"/>
+              <a:t>vegsim</a:t>
+            </a:r>
+            <a:r>
+              <a:rPr lang="en-US" dirty="0"/>
+              <a:t>)</a:t>
+            </a:r>
+          </a:p>
+          <a:p>
+            <a:endParaRPr lang="en-US" dirty="0"/>
           </a:p>
         </p:txBody>
       </p:sp>
       <p:pic>
         <p:nvPicPr>
-          <p:cNvPr id="4" name="Content Placeholder 3">
+          <p:cNvPr id="6" name="Picture 5">
             <a:extLst>
               <a:ext uri="{FF2B5EF4-FFF2-40B4-BE49-F238E27FC236}">
-                <a16:creationId xmlns:a16="http://schemas.microsoft.com/office/drawing/2014/main" id="{C9EE3CD4-007D-4C73-8CCB-7EA625A19BDD}"/>
+                <a16:creationId xmlns:a16="http://schemas.microsoft.com/office/drawing/2014/main" id="{E430025E-F10D-47FF-B1B8-F69057D02329}"/>
               </a:ext>
             </a:extLst>
           </p:cNvPr>
           <p:cNvPicPr>
-            <a:picLocks noGrp="1" noChangeAspect="1"/>
+            <a:picLocks noChangeAspect="1"/>
           </p:cNvPicPr>
-          <p:nvPr>
-            <p:ph idx="1"/>
-          </p:nvPr>
+          <p:nvPr/>
         </p:nvPicPr>
         <p:blipFill>
           <a:blip r:embed="rId2"/>
@@ -3880,8 +4983,8 @@
         </p:blipFill>
         <p:spPr>
           <a:xfrm>
-            <a:off x="2573918" y="1825625"/>
-            <a:ext cx="7044163" cy="4351338"/>
+            <a:off x="6791325" y="2662237"/>
+            <a:ext cx="5010150" cy="3076575"/>
           </a:xfrm>
           <a:prstGeom prst="rect">
             <a:avLst/>
@@ -3891,7 +4994,7 @@
     </p:spTree>
     <p:extLst>
       <p:ext uri="{BB962C8B-B14F-4D97-AF65-F5344CB8AC3E}">
-        <p14:creationId xmlns:p14="http://schemas.microsoft.com/office/powerpoint/2010/main" val="3499134431"/>
+        <p14:creationId xmlns:p14="http://schemas.microsoft.com/office/powerpoint/2010/main" val="2589391508"/>
       </p:ext>
     </p:extLst>
   </p:cSld>
@@ -3935,7 +5038,7 @@
           <a:p>
             <a:r>
               <a:rPr lang="en-US" dirty="0"/>
-              <a:t>Discussion (1 slide)</a:t>
+              <a:t>Analysis (~3 slides)</a:t>
             </a:r>
           </a:p>
         </p:txBody>
@@ -3957,7 +5060,19 @@
           <a:p>
             <a:r>
               <a:rPr lang="en-US" dirty="0"/>
-              <a:t>What does this mean? Interpret your results in light of your original question/hypothesis</a:t>
+              <a:t>What was your approach? What type of model did you fit? </a:t>
+            </a:r>
+          </a:p>
+          <a:p>
+            <a:r>
+              <a:rPr lang="en-US" dirty="0"/>
+              <a:t>Present the formula for your linear model (if relevant)</a:t>
+            </a:r>
+          </a:p>
+          <a:p>
+            <a:r>
+              <a:rPr lang="en-US" dirty="0"/>
+              <a:t>How did you assess significance/importance of predictors? </a:t>
             </a:r>
           </a:p>
         </p:txBody>
@@ -3965,7 +5080,7 @@
     </p:spTree>
     <p:extLst>
       <p:ext uri="{BB962C8B-B14F-4D97-AF65-F5344CB8AC3E}">
-        <p14:creationId xmlns:p14="http://schemas.microsoft.com/office/powerpoint/2010/main" val="1437867342"/>
+        <p14:creationId xmlns:p14="http://schemas.microsoft.com/office/powerpoint/2010/main" val="589861561"/>
       </p:ext>
     </p:extLst>
   </p:cSld>

</xml_diff>